<commit_message>
Uploaded updated motif analysis files
</commit_message>
<xml_diff>
--- a/data/Spring2018/db1-db6_motif_analysis/db1-db6_motif-analysis_BK20180208.pptx
+++ b/data/Spring2018/db1-db6_motif_analysis/db1-db6_motif-analysis_BK20180208.pptx
@@ -5,7 +5,7 @@
     <p:sldMasterId id="2147483648" r:id="rId1"/>
   </p:sldMasterIdLst>
   <p:notesMasterIdLst>
-    <p:notesMasterId r:id="rId9"/>
+    <p:notesMasterId r:id="rId15"/>
   </p:notesMasterIdLst>
   <p:sldIdLst>
     <p:sldId id="256" r:id="rId2"/>
@@ -15,6 +15,12 @@
     <p:sldId id="258" r:id="rId6"/>
     <p:sldId id="257" r:id="rId7"/>
     <p:sldId id="259" r:id="rId8"/>
+    <p:sldId id="264" r:id="rId9"/>
+    <p:sldId id="265" r:id="rId10"/>
+    <p:sldId id="266" r:id="rId11"/>
+    <p:sldId id="267" r:id="rId12"/>
+    <p:sldId id="268" r:id="rId13"/>
+    <p:sldId id="269" r:id="rId14"/>
   </p:sldIdLst>
   <p:sldSz cx="12192000" cy="6858000"/>
   <p:notesSz cx="6858000" cy="9144000"/>
@@ -113,6 +119,11 @@
       </a:defRPr>
     </a:lvl9pPr>
   </p:defaultTextStyle>
+  <p:extLst>
+    <p:ext uri="{EFAFB233-063F-42B5-8137-9DF3F51BA10A}">
+      <p15:sldGuideLst xmlns:p15="http://schemas.microsoft.com/office/powerpoint/2012/main"/>
+    </p:ext>
+  </p:extLst>
 </p:presentation>
 </file>
 
@@ -198,7 +209,7 @@
           <a:p>
             <a:fld id="{554AB565-C6B5-EA47-B6A2-DB4E9F69EEAE}" type="datetimeFigureOut">
               <a:rPr lang="en-US" smtClean="0"/>
-              <a:t>2/9/18</a:t>
+              <a:t>2/22/18</a:t>
             </a:fld>
             <a:endParaRPr lang="en-US"/>
           </a:p>
@@ -1119,6 +1130,567 @@
 </p:notes>
 </file>
 
+<file path=ppt/notesSlides/notesSlide5.xml><?xml version="1.0" encoding="utf-8"?>
+<p:notes xmlns:a="http://schemas.openxmlformats.org/drawingml/2006/main" xmlns:r="http://schemas.openxmlformats.org/officeDocument/2006/relationships" xmlns:p="http://schemas.openxmlformats.org/presentationml/2006/main">
+  <p:cSld>
+    <p:spTree>
+      <p:nvGrpSpPr>
+        <p:cNvPr id="1" name=""/>
+        <p:cNvGrpSpPr/>
+        <p:nvPr/>
+      </p:nvGrpSpPr>
+      <p:grpSpPr>
+        <a:xfrm>
+          <a:off x="0" y="0"/>
+          <a:ext cx="0" cy="0"/>
+          <a:chOff x="0" y="0"/>
+          <a:chExt cx="0" cy="0"/>
+        </a:xfrm>
+      </p:grpSpPr>
+      <p:sp>
+        <p:nvSpPr>
+          <p:cNvPr id="2" name="Slide Image Placeholder 1"/>
+          <p:cNvSpPr>
+            <a:spLocks noGrp="1" noRot="1" noChangeAspect="1"/>
+          </p:cNvSpPr>
+          <p:nvPr>
+            <p:ph type="sldImg"/>
+          </p:nvPr>
+        </p:nvSpPr>
+        <p:spPr/>
+      </p:sp>
+      <p:sp>
+        <p:nvSpPr>
+          <p:cNvPr id="3" name="Notes Placeholder 2"/>
+          <p:cNvSpPr>
+            <a:spLocks noGrp="1"/>
+          </p:cNvSpPr>
+          <p:nvPr>
+            <p:ph type="body" idx="1"/>
+          </p:nvPr>
+        </p:nvSpPr>
+        <p:spPr/>
+        <p:txBody>
+          <a:bodyPr/>
+          <a:lstStyle/>
+          <a:p>
+            <a:r>
+              <a:rPr lang="en-US" dirty="0"/>
+              <a:t>Might want to reorder to match previous figure.</a:t>
+            </a:r>
+          </a:p>
+        </p:txBody>
+      </p:sp>
+      <p:sp>
+        <p:nvSpPr>
+          <p:cNvPr id="4" name="Slide Number Placeholder 3"/>
+          <p:cNvSpPr>
+            <a:spLocks noGrp="1"/>
+          </p:cNvSpPr>
+          <p:nvPr>
+            <p:ph type="sldNum" sz="quarter" idx="10"/>
+          </p:nvPr>
+        </p:nvSpPr>
+        <p:spPr/>
+        <p:txBody>
+          <a:bodyPr/>
+          <a:lstStyle/>
+          <a:p>
+            <a:fld id="{98899137-CC90-C448-81E9-6E62EBD5C2D0}" type="slidenum">
+              <a:rPr lang="en-US" smtClean="0"/>
+              <a:t>9</a:t>
+            </a:fld>
+            <a:endParaRPr lang="en-US"/>
+          </a:p>
+        </p:txBody>
+      </p:sp>
+    </p:spTree>
+    <p:extLst>
+      <p:ext uri="{BB962C8B-B14F-4D97-AF65-F5344CB8AC3E}">
+        <p14:creationId xmlns:p14="http://schemas.microsoft.com/office/powerpoint/2010/main" val="4007966809"/>
+      </p:ext>
+    </p:extLst>
+  </p:cSld>
+  <p:clrMapOvr>
+    <a:masterClrMapping/>
+  </p:clrMapOvr>
+</p:notes>
+</file>
+
+<file path=ppt/notesSlides/notesSlide6.xml><?xml version="1.0" encoding="utf-8"?>
+<p:notes xmlns:a="http://schemas.openxmlformats.org/drawingml/2006/main" xmlns:r="http://schemas.openxmlformats.org/officeDocument/2006/relationships" xmlns:p="http://schemas.openxmlformats.org/presentationml/2006/main">
+  <p:cSld>
+    <p:spTree>
+      <p:nvGrpSpPr>
+        <p:cNvPr id="1" name=""/>
+        <p:cNvGrpSpPr/>
+        <p:nvPr/>
+      </p:nvGrpSpPr>
+      <p:grpSpPr>
+        <a:xfrm>
+          <a:off x="0" y="0"/>
+          <a:ext cx="0" cy="0"/>
+          <a:chOff x="0" y="0"/>
+          <a:chExt cx="0" cy="0"/>
+        </a:xfrm>
+      </p:grpSpPr>
+      <p:sp>
+        <p:nvSpPr>
+          <p:cNvPr id="2" name="Slide Image Placeholder 1"/>
+          <p:cNvSpPr>
+            <a:spLocks noGrp="1" noRot="1" noChangeAspect="1"/>
+          </p:cNvSpPr>
+          <p:nvPr>
+            <p:ph type="sldImg"/>
+          </p:nvPr>
+        </p:nvSpPr>
+        <p:spPr/>
+      </p:sp>
+      <p:sp>
+        <p:nvSpPr>
+          <p:cNvPr id="3" name="Notes Placeholder 2"/>
+          <p:cNvSpPr>
+            <a:spLocks noGrp="1"/>
+          </p:cNvSpPr>
+          <p:nvPr>
+            <p:ph type="body" idx="1"/>
+          </p:nvPr>
+        </p:nvSpPr>
+        <p:spPr/>
+        <p:txBody>
+          <a:bodyPr/>
+          <a:lstStyle/>
+          <a:p>
+            <a:r>
+              <a:rPr lang="en-US" dirty="0"/>
+              <a:t>STB5 has documented cold-sensitive phenotype.</a:t>
+            </a:r>
+          </a:p>
+        </p:txBody>
+      </p:sp>
+      <p:sp>
+        <p:nvSpPr>
+          <p:cNvPr id="4" name="Slide Number Placeholder 3"/>
+          <p:cNvSpPr>
+            <a:spLocks noGrp="1"/>
+          </p:cNvSpPr>
+          <p:nvPr>
+            <p:ph type="sldNum" sz="quarter" idx="10"/>
+          </p:nvPr>
+        </p:nvSpPr>
+        <p:spPr/>
+        <p:txBody>
+          <a:bodyPr/>
+          <a:lstStyle/>
+          <a:p>
+            <a:fld id="{98899137-CC90-C448-81E9-6E62EBD5C2D0}" type="slidenum">
+              <a:rPr lang="en-US" smtClean="0"/>
+              <a:t>10</a:t>
+            </a:fld>
+            <a:endParaRPr lang="en-US"/>
+          </a:p>
+        </p:txBody>
+      </p:sp>
+    </p:spTree>
+    <p:extLst>
+      <p:ext uri="{BB962C8B-B14F-4D97-AF65-F5344CB8AC3E}">
+        <p14:creationId xmlns:p14="http://schemas.microsoft.com/office/powerpoint/2010/main" val="1904720417"/>
+      </p:ext>
+    </p:extLst>
+  </p:cSld>
+  <p:clrMapOvr>
+    <a:masterClrMapping/>
+  </p:clrMapOvr>
+</p:notes>
+</file>
+
+<file path=ppt/notesSlides/notesSlide7.xml><?xml version="1.0" encoding="utf-8"?>
+<p:notes xmlns:a="http://schemas.openxmlformats.org/drawingml/2006/main" xmlns:r="http://schemas.openxmlformats.org/officeDocument/2006/relationships" xmlns:p="http://schemas.openxmlformats.org/presentationml/2006/main">
+  <p:cSld>
+    <p:spTree>
+      <p:nvGrpSpPr>
+        <p:cNvPr id="1" name=""/>
+        <p:cNvGrpSpPr/>
+        <p:nvPr/>
+      </p:nvGrpSpPr>
+      <p:grpSpPr>
+        <a:xfrm>
+          <a:off x="0" y="0"/>
+          <a:ext cx="0" cy="0"/>
+          <a:chOff x="0" y="0"/>
+          <a:chExt cx="0" cy="0"/>
+        </a:xfrm>
+      </p:grpSpPr>
+      <p:sp>
+        <p:nvSpPr>
+          <p:cNvPr id="2" name="Slide Image Placeholder 1"/>
+          <p:cNvSpPr>
+            <a:spLocks noGrp="1" noRot="1" noChangeAspect="1"/>
+          </p:cNvSpPr>
+          <p:nvPr>
+            <p:ph type="sldImg"/>
+          </p:nvPr>
+        </p:nvSpPr>
+        <p:spPr/>
+      </p:sp>
+      <p:sp>
+        <p:nvSpPr>
+          <p:cNvPr id="3" name="Notes Placeholder 2"/>
+          <p:cNvSpPr>
+            <a:spLocks noGrp="1"/>
+          </p:cNvSpPr>
+          <p:nvPr>
+            <p:ph type="body" idx="1"/>
+          </p:nvPr>
+        </p:nvSpPr>
+        <p:spPr/>
+        <p:txBody>
+          <a:bodyPr/>
+          <a:lstStyle/>
+          <a:p>
+            <a:r>
+              <a:rPr lang="en-US" dirty="0"/>
+              <a:t>STB5 has documented cold-sensitive phenotype.</a:t>
+            </a:r>
+          </a:p>
+        </p:txBody>
+      </p:sp>
+      <p:sp>
+        <p:nvSpPr>
+          <p:cNvPr id="4" name="Slide Number Placeholder 3"/>
+          <p:cNvSpPr>
+            <a:spLocks noGrp="1"/>
+          </p:cNvSpPr>
+          <p:nvPr>
+            <p:ph type="sldNum" sz="quarter" idx="10"/>
+          </p:nvPr>
+        </p:nvSpPr>
+        <p:spPr/>
+        <p:txBody>
+          <a:bodyPr/>
+          <a:lstStyle/>
+          <a:p>
+            <a:fld id="{98899137-CC90-C448-81E9-6E62EBD5C2D0}" type="slidenum">
+              <a:rPr lang="en-US" smtClean="0"/>
+              <a:t>11</a:t>
+            </a:fld>
+            <a:endParaRPr lang="en-US"/>
+          </a:p>
+        </p:txBody>
+      </p:sp>
+    </p:spTree>
+    <p:extLst>
+      <p:ext uri="{BB962C8B-B14F-4D97-AF65-F5344CB8AC3E}">
+        <p14:creationId xmlns:p14="http://schemas.microsoft.com/office/powerpoint/2010/main" val="1822780712"/>
+      </p:ext>
+    </p:extLst>
+  </p:cSld>
+  <p:clrMapOvr>
+    <a:masterClrMapping/>
+  </p:clrMapOvr>
+</p:notes>
+</file>
+
+<file path=ppt/notesSlides/notesSlide8.xml><?xml version="1.0" encoding="utf-8"?>
+<p:notes xmlns:a="http://schemas.openxmlformats.org/drawingml/2006/main" xmlns:r="http://schemas.openxmlformats.org/officeDocument/2006/relationships" xmlns:p="http://schemas.openxmlformats.org/presentationml/2006/main">
+  <p:cSld>
+    <p:spTree>
+      <p:nvGrpSpPr>
+        <p:cNvPr id="1" name=""/>
+        <p:cNvGrpSpPr/>
+        <p:nvPr/>
+      </p:nvGrpSpPr>
+      <p:grpSpPr>
+        <a:xfrm>
+          <a:off x="0" y="0"/>
+          <a:ext cx="0" cy="0"/>
+          <a:chOff x="0" y="0"/>
+          <a:chExt cx="0" cy="0"/>
+        </a:xfrm>
+      </p:grpSpPr>
+      <p:sp>
+        <p:nvSpPr>
+          <p:cNvPr id="2" name="Slide Image Placeholder 1"/>
+          <p:cNvSpPr>
+            <a:spLocks noGrp="1" noRot="1" noChangeAspect="1"/>
+          </p:cNvSpPr>
+          <p:nvPr>
+            <p:ph type="sldImg"/>
+          </p:nvPr>
+        </p:nvSpPr>
+        <p:spPr/>
+      </p:sp>
+      <p:sp>
+        <p:nvSpPr>
+          <p:cNvPr id="3" name="Notes Placeholder 2"/>
+          <p:cNvSpPr>
+            <a:spLocks noGrp="1"/>
+          </p:cNvSpPr>
+          <p:nvPr>
+            <p:ph type="body" idx="1"/>
+          </p:nvPr>
+        </p:nvSpPr>
+        <p:spPr/>
+        <p:txBody>
+          <a:bodyPr/>
+          <a:lstStyle/>
+          <a:p>
+            <a:endParaRPr lang="en-US" dirty="0"/>
+          </a:p>
+        </p:txBody>
+      </p:sp>
+      <p:sp>
+        <p:nvSpPr>
+          <p:cNvPr id="4" name="Slide Number Placeholder 3"/>
+          <p:cNvSpPr>
+            <a:spLocks noGrp="1"/>
+          </p:cNvSpPr>
+          <p:nvPr>
+            <p:ph type="sldNum" sz="quarter" idx="10"/>
+          </p:nvPr>
+        </p:nvSpPr>
+        <p:spPr/>
+        <p:txBody>
+          <a:bodyPr/>
+          <a:lstStyle/>
+          <a:p>
+            <a:fld id="{98899137-CC90-C448-81E9-6E62EBD5C2D0}" type="slidenum">
+              <a:rPr lang="en-US" smtClean="0"/>
+              <a:t>12</a:t>
+            </a:fld>
+            <a:endParaRPr lang="en-US"/>
+          </a:p>
+        </p:txBody>
+      </p:sp>
+    </p:spTree>
+    <p:extLst>
+      <p:ext uri="{BB962C8B-B14F-4D97-AF65-F5344CB8AC3E}">
+        <p14:creationId xmlns:p14="http://schemas.microsoft.com/office/powerpoint/2010/main" val="648469469"/>
+      </p:ext>
+    </p:extLst>
+  </p:cSld>
+  <p:clrMapOvr>
+    <a:masterClrMapping/>
+  </p:clrMapOvr>
+</p:notes>
+</file>
+
+<file path=ppt/notesSlides/notesSlide9.xml><?xml version="1.0" encoding="utf-8"?>
+<p:notes xmlns:a="http://schemas.openxmlformats.org/drawingml/2006/main" xmlns:r="http://schemas.openxmlformats.org/officeDocument/2006/relationships" xmlns:p="http://schemas.openxmlformats.org/presentationml/2006/main">
+  <p:cSld>
+    <p:spTree>
+      <p:nvGrpSpPr>
+        <p:cNvPr id="1" name=""/>
+        <p:cNvGrpSpPr/>
+        <p:nvPr/>
+      </p:nvGrpSpPr>
+      <p:grpSpPr>
+        <a:xfrm>
+          <a:off x="0" y="0"/>
+          <a:ext cx="0" cy="0"/>
+          <a:chOff x="0" y="0"/>
+          <a:chExt cx="0" cy="0"/>
+        </a:xfrm>
+      </p:grpSpPr>
+      <p:sp>
+        <p:nvSpPr>
+          <p:cNvPr id="2" name="Slide Image Placeholder 1"/>
+          <p:cNvSpPr>
+            <a:spLocks noGrp="1" noRot="1" noChangeAspect="1"/>
+          </p:cNvSpPr>
+          <p:nvPr>
+            <p:ph type="sldImg"/>
+          </p:nvPr>
+        </p:nvSpPr>
+        <p:spPr/>
+      </p:sp>
+      <p:sp>
+        <p:nvSpPr>
+          <p:cNvPr id="3" name="Notes Placeholder 2"/>
+          <p:cNvSpPr>
+            <a:spLocks noGrp="1"/>
+          </p:cNvSpPr>
+          <p:nvPr>
+            <p:ph type="body" idx="1"/>
+          </p:nvPr>
+        </p:nvSpPr>
+        <p:spPr/>
+        <p:txBody>
+          <a:bodyPr/>
+          <a:lstStyle/>
+          <a:p>
+            <a:r>
+              <a:rPr lang="en-US" dirty="0"/>
+              <a:t>Sample of built out hypothesis network.</a:t>
+            </a:r>
+          </a:p>
+          <a:p>
+            <a:endParaRPr lang="en-US" dirty="0"/>
+          </a:p>
+          <a:p>
+            <a:r>
+              <a:rPr lang="en-US" dirty="0"/>
+              <a:t>15 genes, 34 edges (highly connected; most similar to db4 in this respect, which had lowest </a:t>
+            </a:r>
+            <a:r>
+              <a:rPr lang="en-US" dirty="0" err="1"/>
+              <a:t>LSE:minLSE</a:t>
+            </a:r>
+            <a:r>
+              <a:rPr lang="en-US" dirty="0"/>
+              <a:t> ratio but also included TEC1).</a:t>
+            </a:r>
+          </a:p>
+          <a:p>
+            <a:endParaRPr lang="en-US" dirty="0"/>
+          </a:p>
+          <a:p>
+            <a:r>
+              <a:rPr lang="en-US" dirty="0"/>
+              <a:t>Colored pairs = paralogs.</a:t>
+            </a:r>
+          </a:p>
+          <a:p>
+            <a:r>
+              <a:rPr lang="en-US" dirty="0"/>
+              <a:t>Orange borders = known cold-sensitive phenotypes on SGD.</a:t>
+            </a:r>
+          </a:p>
+          <a:p>
+            <a:r>
+              <a:rPr lang="en-US" dirty="0"/>
+              <a:t>Green borders = tested by Dahlquist lab.</a:t>
+            </a:r>
+          </a:p>
+          <a:p>
+            <a:r>
+              <a:rPr lang="en-US" dirty="0"/>
+              <a:t>Light grey shading = appears distinct from ESR (not MSN2/4 mediated).</a:t>
+            </a:r>
+          </a:p>
+          <a:p>
+            <a:endParaRPr lang="en-US" dirty="0"/>
+          </a:p>
+          <a:p>
+            <a:r>
+              <a:rPr lang="en-US" b="1" dirty="0"/>
+              <a:t>SFP1</a:t>
+            </a:r>
+            <a:r>
+              <a:rPr lang="en-US" dirty="0"/>
+              <a:t> in 5/6 networks + high </a:t>
+            </a:r>
+            <a:r>
+              <a:rPr lang="en-US" b="1" dirty="0" err="1"/>
+              <a:t>eigen</a:t>
+            </a:r>
+            <a:r>
+              <a:rPr lang="en-US" dirty="0"/>
+              <a:t> + consistent repression of SWI5.</a:t>
+            </a:r>
+          </a:p>
+          <a:p>
+            <a:r>
+              <a:rPr lang="en-US" b="1" dirty="0"/>
+              <a:t>GCN4</a:t>
+            </a:r>
+            <a:r>
+              <a:rPr lang="en-US" dirty="0"/>
+              <a:t> has </a:t>
+            </a:r>
+            <a:r>
+              <a:rPr lang="en-US" b="1" dirty="0" err="1"/>
+              <a:t>eigen</a:t>
+            </a:r>
+            <a:r>
+              <a:rPr lang="en-US" dirty="0"/>
+              <a:t> of 1 in both networks where it appears… connects disparate “modules” and created negative feedback loop.</a:t>
+            </a:r>
+          </a:p>
+          <a:p>
+            <a:endParaRPr lang="en-US" dirty="0"/>
+          </a:p>
+          <a:p>
+            <a:r>
+              <a:rPr lang="en-US" dirty="0"/>
+              <a:t>Nodes that did not make it: </a:t>
+            </a:r>
+            <a:r>
+              <a:rPr lang="en-US" b="1" dirty="0"/>
+              <a:t>TEC1</a:t>
+            </a:r>
+            <a:r>
+              <a:rPr lang="en-US" dirty="0"/>
+              <a:t> (highly connected, but 1 network), </a:t>
+            </a:r>
+            <a:r>
+              <a:rPr lang="en-US" b="1" dirty="0"/>
+              <a:t>GCR2</a:t>
+            </a:r>
+            <a:r>
+              <a:rPr lang="en-US" dirty="0"/>
+              <a:t> (5/6, but negligible experimental expression ∆), </a:t>
+            </a:r>
+            <a:r>
+              <a:rPr lang="en-US" b="1" dirty="0"/>
+              <a:t>CST6</a:t>
+            </a:r>
+            <a:r>
+              <a:rPr lang="en-US" dirty="0"/>
+              <a:t> (known cold phenotype, but only connected to </a:t>
+            </a:r>
+            <a:r>
+              <a:rPr lang="en-US" b="1" dirty="0"/>
+              <a:t>ABF1</a:t>
+            </a:r>
+            <a:r>
+              <a:rPr lang="en-US" dirty="0"/>
+              <a:t>, which is not in this </a:t>
+            </a:r>
+            <a:r>
+              <a:rPr lang="en-US"/>
+              <a:t>GRN).</a:t>
+            </a:r>
+            <a:endParaRPr lang="en-US" dirty="0"/>
+          </a:p>
+        </p:txBody>
+      </p:sp>
+      <p:sp>
+        <p:nvSpPr>
+          <p:cNvPr id="4" name="Slide Number Placeholder 3"/>
+          <p:cNvSpPr>
+            <a:spLocks noGrp="1"/>
+          </p:cNvSpPr>
+          <p:nvPr>
+            <p:ph type="sldNum" sz="quarter" idx="10"/>
+          </p:nvPr>
+        </p:nvSpPr>
+        <p:spPr/>
+        <p:txBody>
+          <a:bodyPr/>
+          <a:lstStyle/>
+          <a:p>
+            <a:fld id="{98899137-CC90-C448-81E9-6E62EBD5C2D0}" type="slidenum">
+              <a:rPr lang="en-US" smtClean="0"/>
+              <a:t>13</a:t>
+            </a:fld>
+            <a:endParaRPr lang="en-US"/>
+          </a:p>
+        </p:txBody>
+      </p:sp>
+    </p:spTree>
+    <p:extLst>
+      <p:ext uri="{BB962C8B-B14F-4D97-AF65-F5344CB8AC3E}">
+        <p14:creationId xmlns:p14="http://schemas.microsoft.com/office/powerpoint/2010/main" val="3653099824"/>
+      </p:ext>
+    </p:extLst>
+  </p:cSld>
+  <p:clrMapOvr>
+    <a:masterClrMapping/>
+  </p:clrMapOvr>
+</p:notes>
+</file>
+
 <file path=ppt/slideLayouts/slideLayout1.xml><?xml version="1.0" encoding="utf-8"?>
 <p:sldLayout xmlns:a="http://schemas.openxmlformats.org/drawingml/2006/main" xmlns:r="http://schemas.openxmlformats.org/officeDocument/2006/relationships" xmlns:p="http://schemas.openxmlformats.org/presentationml/2006/main" type="title" preserve="1">
   <p:cSld name="Title Slide">
@@ -1266,7 +1838,7 @@
           <a:p>
             <a:fld id="{6171393B-FA56-FF45-BB6F-1F10CB4A0F38}" type="datetimeFigureOut">
               <a:rPr lang="en-US" smtClean="0"/>
-              <a:t>2/9/18</a:t>
+              <a:t>2/22/18</a:t>
             </a:fld>
             <a:endParaRPr lang="en-US"/>
           </a:p>
@@ -1464,7 +2036,7 @@
           <a:p>
             <a:fld id="{6171393B-FA56-FF45-BB6F-1F10CB4A0F38}" type="datetimeFigureOut">
               <a:rPr lang="en-US" smtClean="0"/>
-              <a:t>2/9/18</a:t>
+              <a:t>2/22/18</a:t>
             </a:fld>
             <a:endParaRPr lang="en-US"/>
           </a:p>
@@ -1672,7 +2244,7 @@
           <a:p>
             <a:fld id="{6171393B-FA56-FF45-BB6F-1F10CB4A0F38}" type="datetimeFigureOut">
               <a:rPr lang="en-US" smtClean="0"/>
-              <a:t>2/9/18</a:t>
+              <a:t>2/22/18</a:t>
             </a:fld>
             <a:endParaRPr lang="en-US"/>
           </a:p>
@@ -1870,7 +2442,7 @@
           <a:p>
             <a:fld id="{6171393B-FA56-FF45-BB6F-1F10CB4A0F38}" type="datetimeFigureOut">
               <a:rPr lang="en-US" smtClean="0"/>
-              <a:t>2/9/18</a:t>
+              <a:t>2/22/18</a:t>
             </a:fld>
             <a:endParaRPr lang="en-US"/>
           </a:p>
@@ -2145,7 +2717,7 @@
           <a:p>
             <a:fld id="{6171393B-FA56-FF45-BB6F-1F10CB4A0F38}" type="datetimeFigureOut">
               <a:rPr lang="en-US" smtClean="0"/>
-              <a:t>2/9/18</a:t>
+              <a:t>2/22/18</a:t>
             </a:fld>
             <a:endParaRPr lang="en-US"/>
           </a:p>
@@ -2410,7 +2982,7 @@
           <a:p>
             <a:fld id="{6171393B-FA56-FF45-BB6F-1F10CB4A0F38}" type="datetimeFigureOut">
               <a:rPr lang="en-US" smtClean="0"/>
-              <a:t>2/9/18</a:t>
+              <a:t>2/22/18</a:t>
             </a:fld>
             <a:endParaRPr lang="en-US"/>
           </a:p>
@@ -2822,7 +3394,7 @@
           <a:p>
             <a:fld id="{6171393B-FA56-FF45-BB6F-1F10CB4A0F38}" type="datetimeFigureOut">
               <a:rPr lang="en-US" smtClean="0"/>
-              <a:t>2/9/18</a:t>
+              <a:t>2/22/18</a:t>
             </a:fld>
             <a:endParaRPr lang="en-US"/>
           </a:p>
@@ -2963,7 +3535,7 @@
           <a:p>
             <a:fld id="{6171393B-FA56-FF45-BB6F-1F10CB4A0F38}" type="datetimeFigureOut">
               <a:rPr lang="en-US" smtClean="0"/>
-              <a:t>2/9/18</a:t>
+              <a:t>2/22/18</a:t>
             </a:fld>
             <a:endParaRPr lang="en-US"/>
           </a:p>
@@ -3076,7 +3648,7 @@
           <a:p>
             <a:fld id="{6171393B-FA56-FF45-BB6F-1F10CB4A0F38}" type="datetimeFigureOut">
               <a:rPr lang="en-US" smtClean="0"/>
-              <a:t>2/9/18</a:t>
+              <a:t>2/22/18</a:t>
             </a:fld>
             <a:endParaRPr lang="en-US"/>
           </a:p>
@@ -3387,7 +3959,7 @@
           <a:p>
             <a:fld id="{6171393B-FA56-FF45-BB6F-1F10CB4A0F38}" type="datetimeFigureOut">
               <a:rPr lang="en-US" smtClean="0"/>
-              <a:t>2/9/18</a:t>
+              <a:t>2/22/18</a:t>
             </a:fld>
             <a:endParaRPr lang="en-US"/>
           </a:p>
@@ -3675,7 +4247,7 @@
           <a:p>
             <a:fld id="{6171393B-FA56-FF45-BB6F-1F10CB4A0F38}" type="datetimeFigureOut">
               <a:rPr lang="en-US" smtClean="0"/>
-              <a:t>2/9/18</a:t>
+              <a:t>2/22/18</a:t>
             </a:fld>
             <a:endParaRPr lang="en-US"/>
           </a:p>
@@ -3916,7 +4488,7 @@
           <a:p>
             <a:fld id="{6171393B-FA56-FF45-BB6F-1F10CB4A0F38}" type="datetimeFigureOut">
               <a:rPr lang="en-US" smtClean="0"/>
-              <a:t>2/9/18</a:t>
+              <a:t>2/22/18</a:t>
             </a:fld>
             <a:endParaRPr lang="en-US"/>
           </a:p>
@@ -4408,6 +4980,1239 @@
 </p:sld>
 </file>
 
+<file path=ppt/slides/slide10.xml><?xml version="1.0" encoding="utf-8"?>
+<p:sld xmlns:a="http://schemas.openxmlformats.org/drawingml/2006/main" xmlns:r="http://schemas.openxmlformats.org/officeDocument/2006/relationships" xmlns:p="http://schemas.openxmlformats.org/presentationml/2006/main">
+  <p:cSld>
+    <p:spTree>
+      <p:nvGrpSpPr>
+        <p:cNvPr id="1" name=""/>
+        <p:cNvGrpSpPr/>
+        <p:nvPr/>
+      </p:nvGrpSpPr>
+      <p:grpSpPr>
+        <a:xfrm>
+          <a:off x="0" y="0"/>
+          <a:ext cx="0" cy="0"/>
+          <a:chOff x="0" y="0"/>
+          <a:chExt cx="0" cy="0"/>
+        </a:xfrm>
+      </p:grpSpPr>
+      <p:pic>
+        <p:nvPicPr>
+          <p:cNvPr id="3" name="Picture 2">
+            <a:extLst>
+              <a:ext uri="{FF2B5EF4-FFF2-40B4-BE49-F238E27FC236}">
+                <a16:creationId xmlns:a16="http://schemas.microsoft.com/office/drawing/2014/main" id="{BFC5F398-7F0C-F148-A464-271730E2CA27}"/>
+              </a:ext>
+            </a:extLst>
+          </p:cNvPr>
+          <p:cNvPicPr>
+            <a:picLocks noChangeAspect="1"/>
+          </p:cNvPicPr>
+          <p:nvPr/>
+        </p:nvPicPr>
+        <p:blipFill>
+          <a:blip r:embed="rId3">
+            <a:extLst>
+              <a:ext uri="{28A0092B-C50C-407E-A947-70E740481C1C}">
+                <a14:useLocalDpi xmlns:a14="http://schemas.microsoft.com/office/drawing/2010/main" val="0"/>
+              </a:ext>
+            </a:extLst>
+          </a:blip>
+          <a:stretch>
+            <a:fillRect/>
+          </a:stretch>
+        </p:blipFill>
+        <p:spPr>
+          <a:xfrm>
+            <a:off x="247286" y="268580"/>
+            <a:ext cx="11666040" cy="6388941"/>
+          </a:xfrm>
+          <a:prstGeom prst="rect">
+            <a:avLst/>
+          </a:prstGeom>
+        </p:spPr>
+      </p:pic>
+      <p:sp>
+        <p:nvSpPr>
+          <p:cNvPr id="4" name="Rectangle 3">
+            <a:extLst>
+              <a:ext uri="{FF2B5EF4-FFF2-40B4-BE49-F238E27FC236}">
+                <a16:creationId xmlns:a16="http://schemas.microsoft.com/office/drawing/2014/main" id="{6D3E81A0-1AD6-AF48-B171-A92532F4A8A7}"/>
+              </a:ext>
+            </a:extLst>
+          </p:cNvPr>
+          <p:cNvSpPr/>
+          <p:nvPr/>
+        </p:nvSpPr>
+        <p:spPr>
+          <a:xfrm>
+            <a:off x="0" y="4674211"/>
+            <a:ext cx="2470484" cy="2157663"/>
+          </a:xfrm>
+          <a:prstGeom prst="rect">
+            <a:avLst/>
+          </a:prstGeom>
+          <a:solidFill>
+            <a:schemeClr val="bg1"/>
+          </a:solidFill>
+          <a:ln>
+            <a:solidFill>
+              <a:schemeClr val="bg1"/>
+            </a:solidFill>
+          </a:ln>
+        </p:spPr>
+        <p:style>
+          <a:lnRef idx="2">
+            <a:schemeClr val="accent1">
+              <a:shade val="50000"/>
+            </a:schemeClr>
+          </a:lnRef>
+          <a:fillRef idx="1">
+            <a:schemeClr val="accent1"/>
+          </a:fillRef>
+          <a:effectRef idx="0">
+            <a:schemeClr val="accent1"/>
+          </a:effectRef>
+          <a:fontRef idx="minor">
+            <a:schemeClr val="lt1"/>
+          </a:fontRef>
+        </p:style>
+        <p:txBody>
+          <a:bodyPr rtlCol="0" anchor="ctr"/>
+          <a:lstStyle/>
+          <a:p>
+            <a:pPr algn="ctr"/>
+            <a:endParaRPr lang="en-US" dirty="0"/>
+          </a:p>
+        </p:txBody>
+      </p:sp>
+    </p:spTree>
+    <p:extLst>
+      <p:ext uri="{BB962C8B-B14F-4D97-AF65-F5344CB8AC3E}">
+        <p14:creationId xmlns:p14="http://schemas.microsoft.com/office/powerpoint/2010/main" val="1352654624"/>
+      </p:ext>
+    </p:extLst>
+  </p:cSld>
+  <p:clrMapOvr>
+    <a:masterClrMapping/>
+  </p:clrMapOvr>
+</p:sld>
+</file>
+
+<file path=ppt/slides/slide11.xml><?xml version="1.0" encoding="utf-8"?>
+<p:sld xmlns:a="http://schemas.openxmlformats.org/drawingml/2006/main" xmlns:r="http://schemas.openxmlformats.org/officeDocument/2006/relationships" xmlns:p="http://schemas.openxmlformats.org/presentationml/2006/main">
+  <p:cSld>
+    <p:spTree>
+      <p:nvGrpSpPr>
+        <p:cNvPr id="1" name=""/>
+        <p:cNvGrpSpPr/>
+        <p:nvPr/>
+      </p:nvGrpSpPr>
+      <p:grpSpPr>
+        <a:xfrm>
+          <a:off x="0" y="0"/>
+          <a:ext cx="0" cy="0"/>
+          <a:chOff x="0" y="0"/>
+          <a:chExt cx="0" cy="0"/>
+        </a:xfrm>
+      </p:grpSpPr>
+      <p:pic>
+        <p:nvPicPr>
+          <p:cNvPr id="3" name="Picture 2">
+            <a:extLst>
+              <a:ext uri="{FF2B5EF4-FFF2-40B4-BE49-F238E27FC236}">
+                <a16:creationId xmlns:a16="http://schemas.microsoft.com/office/drawing/2014/main" id="{BFC5F398-7F0C-F148-A464-271730E2CA27}"/>
+              </a:ext>
+            </a:extLst>
+          </p:cNvPr>
+          <p:cNvPicPr>
+            <a:picLocks noChangeAspect="1"/>
+          </p:cNvPicPr>
+          <p:nvPr/>
+        </p:nvPicPr>
+        <p:blipFill>
+          <a:blip r:embed="rId3">
+            <a:extLst>
+              <a:ext uri="{28A0092B-C50C-407E-A947-70E740481C1C}">
+                <a14:useLocalDpi xmlns:a14="http://schemas.microsoft.com/office/drawing/2010/main" val="0"/>
+              </a:ext>
+            </a:extLst>
+          </a:blip>
+          <a:stretch>
+            <a:fillRect/>
+          </a:stretch>
+        </p:blipFill>
+        <p:spPr>
+          <a:xfrm>
+            <a:off x="247286" y="268580"/>
+            <a:ext cx="11666040" cy="6388941"/>
+          </a:xfrm>
+          <a:prstGeom prst="rect">
+            <a:avLst/>
+          </a:prstGeom>
+        </p:spPr>
+      </p:pic>
+      <p:sp>
+        <p:nvSpPr>
+          <p:cNvPr id="4" name="Rectangle 3">
+            <a:extLst>
+              <a:ext uri="{FF2B5EF4-FFF2-40B4-BE49-F238E27FC236}">
+                <a16:creationId xmlns:a16="http://schemas.microsoft.com/office/drawing/2014/main" id="{6D3E81A0-1AD6-AF48-B171-A92532F4A8A7}"/>
+              </a:ext>
+            </a:extLst>
+          </p:cNvPr>
+          <p:cNvSpPr/>
+          <p:nvPr/>
+        </p:nvSpPr>
+        <p:spPr>
+          <a:xfrm>
+            <a:off x="0" y="4674211"/>
+            <a:ext cx="2470484" cy="2157663"/>
+          </a:xfrm>
+          <a:prstGeom prst="rect">
+            <a:avLst/>
+          </a:prstGeom>
+          <a:solidFill>
+            <a:schemeClr val="bg1"/>
+          </a:solidFill>
+          <a:ln>
+            <a:solidFill>
+              <a:schemeClr val="bg1"/>
+            </a:solidFill>
+          </a:ln>
+        </p:spPr>
+        <p:style>
+          <a:lnRef idx="2">
+            <a:schemeClr val="accent1">
+              <a:shade val="50000"/>
+            </a:schemeClr>
+          </a:lnRef>
+          <a:fillRef idx="1">
+            <a:schemeClr val="accent1"/>
+          </a:fillRef>
+          <a:effectRef idx="0">
+            <a:schemeClr val="accent1"/>
+          </a:effectRef>
+          <a:fontRef idx="minor">
+            <a:schemeClr val="lt1"/>
+          </a:fontRef>
+        </p:style>
+        <p:txBody>
+          <a:bodyPr rtlCol="0" anchor="ctr"/>
+          <a:lstStyle/>
+          <a:p>
+            <a:pPr algn="ctr"/>
+            <a:endParaRPr lang="en-US" dirty="0"/>
+          </a:p>
+        </p:txBody>
+      </p:sp>
+      <p:sp>
+        <p:nvSpPr>
+          <p:cNvPr id="5" name="Oval 4">
+            <a:extLst>
+              <a:ext uri="{FF2B5EF4-FFF2-40B4-BE49-F238E27FC236}">
+                <a16:creationId xmlns:a16="http://schemas.microsoft.com/office/drawing/2014/main" id="{39173EAC-ECD1-844D-B184-4EDC8FF14CFF}"/>
+              </a:ext>
+            </a:extLst>
+          </p:cNvPr>
+          <p:cNvSpPr/>
+          <p:nvPr/>
+        </p:nvSpPr>
+        <p:spPr>
+          <a:xfrm>
+            <a:off x="0" y="204412"/>
+            <a:ext cx="1636295" cy="998746"/>
+          </a:xfrm>
+          <a:prstGeom prst="ellipse">
+            <a:avLst/>
+          </a:prstGeom>
+          <a:noFill/>
+          <a:ln>
+            <a:solidFill>
+              <a:schemeClr val="tx1"/>
+            </a:solidFill>
+          </a:ln>
+        </p:spPr>
+        <p:style>
+          <a:lnRef idx="2">
+            <a:schemeClr val="accent1">
+              <a:shade val="50000"/>
+            </a:schemeClr>
+          </a:lnRef>
+          <a:fillRef idx="1">
+            <a:schemeClr val="accent1"/>
+          </a:fillRef>
+          <a:effectRef idx="0">
+            <a:schemeClr val="accent1"/>
+          </a:effectRef>
+          <a:fontRef idx="minor">
+            <a:schemeClr val="lt1"/>
+          </a:fontRef>
+        </p:style>
+        <p:txBody>
+          <a:bodyPr rtlCol="0" anchor="ctr"/>
+          <a:lstStyle/>
+          <a:p>
+            <a:pPr algn="ctr"/>
+            <a:endParaRPr lang="en-US" dirty="0"/>
+          </a:p>
+        </p:txBody>
+      </p:sp>
+    </p:spTree>
+    <p:extLst>
+      <p:ext uri="{BB962C8B-B14F-4D97-AF65-F5344CB8AC3E}">
+        <p14:creationId xmlns:p14="http://schemas.microsoft.com/office/powerpoint/2010/main" val="2601888613"/>
+      </p:ext>
+    </p:extLst>
+  </p:cSld>
+  <p:clrMapOvr>
+    <a:masterClrMapping/>
+  </p:clrMapOvr>
+</p:sld>
+</file>
+
+<file path=ppt/slides/slide12.xml><?xml version="1.0" encoding="utf-8"?>
+<p:sld xmlns:a="http://schemas.openxmlformats.org/drawingml/2006/main" xmlns:r="http://schemas.openxmlformats.org/officeDocument/2006/relationships" xmlns:p="http://schemas.openxmlformats.org/presentationml/2006/main">
+  <p:cSld>
+    <p:spTree>
+      <p:nvGrpSpPr>
+        <p:cNvPr id="1" name=""/>
+        <p:cNvGrpSpPr/>
+        <p:nvPr/>
+      </p:nvGrpSpPr>
+      <p:grpSpPr>
+        <a:xfrm>
+          <a:off x="0" y="0"/>
+          <a:ext cx="0" cy="0"/>
+          <a:chOff x="0" y="0"/>
+          <a:chExt cx="0" cy="0"/>
+        </a:xfrm>
+      </p:grpSpPr>
+      <p:pic>
+        <p:nvPicPr>
+          <p:cNvPr id="5" name="Picture 4">
+            <a:extLst>
+              <a:ext uri="{FF2B5EF4-FFF2-40B4-BE49-F238E27FC236}">
+                <a16:creationId xmlns:a16="http://schemas.microsoft.com/office/drawing/2014/main" id="{FCCEC705-5F1A-FC48-AA02-98D7447B7A19}"/>
+              </a:ext>
+            </a:extLst>
+          </p:cNvPr>
+          <p:cNvPicPr>
+            <a:picLocks noChangeAspect="1"/>
+          </p:cNvPicPr>
+          <p:nvPr/>
+        </p:nvPicPr>
+        <p:blipFill>
+          <a:blip r:embed="rId3">
+            <a:extLst>
+              <a:ext uri="{28A0092B-C50C-407E-A947-70E740481C1C}">
+                <a14:useLocalDpi xmlns:a14="http://schemas.microsoft.com/office/drawing/2010/main" val="0"/>
+              </a:ext>
+            </a:extLst>
+          </a:blip>
+          <a:stretch>
+            <a:fillRect/>
+          </a:stretch>
+        </p:blipFill>
+        <p:spPr>
+          <a:xfrm>
+            <a:off x="1219200" y="71311"/>
+            <a:ext cx="9850582" cy="6786689"/>
+          </a:xfrm>
+          <a:prstGeom prst="rect">
+            <a:avLst/>
+          </a:prstGeom>
+        </p:spPr>
+      </p:pic>
+    </p:spTree>
+    <p:extLst>
+      <p:ext uri="{BB962C8B-B14F-4D97-AF65-F5344CB8AC3E}">
+        <p14:creationId xmlns:p14="http://schemas.microsoft.com/office/powerpoint/2010/main" val="1132422900"/>
+      </p:ext>
+    </p:extLst>
+  </p:cSld>
+  <p:clrMapOvr>
+    <a:masterClrMapping/>
+  </p:clrMapOvr>
+</p:sld>
+</file>
+
+<file path=ppt/slides/slide13.xml><?xml version="1.0" encoding="utf-8"?>
+<p:sld xmlns:a="http://schemas.openxmlformats.org/drawingml/2006/main" xmlns:r="http://schemas.openxmlformats.org/officeDocument/2006/relationships" xmlns:p="http://schemas.openxmlformats.org/presentationml/2006/main">
+  <p:cSld>
+    <p:spTree>
+      <p:nvGrpSpPr>
+        <p:cNvPr id="1" name=""/>
+        <p:cNvGrpSpPr/>
+        <p:nvPr/>
+      </p:nvGrpSpPr>
+      <p:grpSpPr>
+        <a:xfrm>
+          <a:off x="0" y="0"/>
+          <a:ext cx="0" cy="0"/>
+          <a:chOff x="0" y="0"/>
+          <a:chExt cx="0" cy="0"/>
+        </a:xfrm>
+      </p:grpSpPr>
+      <p:pic>
+        <p:nvPicPr>
+          <p:cNvPr id="5" name="Picture 4">
+            <a:extLst>
+              <a:ext uri="{FF2B5EF4-FFF2-40B4-BE49-F238E27FC236}">
+                <a16:creationId xmlns:a16="http://schemas.microsoft.com/office/drawing/2014/main" id="{FCCEC705-5F1A-FC48-AA02-98D7447B7A19}"/>
+              </a:ext>
+            </a:extLst>
+          </p:cNvPr>
+          <p:cNvPicPr>
+            <a:picLocks noChangeAspect="1"/>
+          </p:cNvPicPr>
+          <p:nvPr/>
+        </p:nvPicPr>
+        <p:blipFill>
+          <a:blip r:embed="rId3">
+            <a:extLst>
+              <a:ext uri="{28A0092B-C50C-407E-A947-70E740481C1C}">
+                <a14:useLocalDpi xmlns:a14="http://schemas.microsoft.com/office/drawing/2010/main" val="0"/>
+              </a:ext>
+            </a:extLst>
+          </a:blip>
+          <a:stretch>
+            <a:fillRect/>
+          </a:stretch>
+        </p:blipFill>
+        <p:spPr>
+          <a:xfrm>
+            <a:off x="1219200" y="71311"/>
+            <a:ext cx="9850582" cy="6786689"/>
+          </a:xfrm>
+          <a:prstGeom prst="rect">
+            <a:avLst/>
+          </a:prstGeom>
+        </p:spPr>
+      </p:pic>
+      <p:grpSp>
+        <p:nvGrpSpPr>
+          <p:cNvPr id="3" name="Group 2">
+            <a:extLst>
+              <a:ext uri="{FF2B5EF4-FFF2-40B4-BE49-F238E27FC236}">
+                <a16:creationId xmlns:a16="http://schemas.microsoft.com/office/drawing/2014/main" id="{9B02B2B6-E242-8347-8DD2-A710600E8DAF}"/>
+              </a:ext>
+            </a:extLst>
+          </p:cNvPr>
+          <p:cNvGrpSpPr/>
+          <p:nvPr/>
+        </p:nvGrpSpPr>
+        <p:grpSpPr>
+          <a:xfrm>
+            <a:off x="1472592" y="241213"/>
+            <a:ext cx="9496926" cy="5494569"/>
+            <a:chOff x="1472592" y="241213"/>
+            <a:chExt cx="9496926" cy="5494569"/>
+          </a:xfrm>
+        </p:grpSpPr>
+        <p:grpSp>
+          <p:nvGrpSpPr>
+            <p:cNvPr id="2" name="Group 1">
+              <a:extLst>
+                <a:ext uri="{FF2B5EF4-FFF2-40B4-BE49-F238E27FC236}">
+                  <a16:creationId xmlns:a16="http://schemas.microsoft.com/office/drawing/2014/main" id="{EB030AC2-F693-C947-909C-29A36AF909C4}"/>
+                </a:ext>
+              </a:extLst>
+            </p:cNvPr>
+            <p:cNvGrpSpPr/>
+            <p:nvPr/>
+          </p:nvGrpSpPr>
+          <p:grpSpPr>
+            <a:xfrm>
+              <a:off x="1873644" y="241213"/>
+              <a:ext cx="7602865" cy="5494569"/>
+              <a:chOff x="1873644" y="241213"/>
+              <a:chExt cx="7602865" cy="5494569"/>
+            </a:xfrm>
+          </p:grpSpPr>
+          <p:grpSp>
+            <p:nvGrpSpPr>
+              <p:cNvPr id="17" name="Group 16">
+                <a:extLst>
+                  <a:ext uri="{FF2B5EF4-FFF2-40B4-BE49-F238E27FC236}">
+                    <a16:creationId xmlns:a16="http://schemas.microsoft.com/office/drawing/2014/main" id="{830A3066-4C71-944C-B3E8-51331D0D14AD}"/>
+                  </a:ext>
+                </a:extLst>
+              </p:cNvPr>
+              <p:cNvGrpSpPr/>
+              <p:nvPr/>
+            </p:nvGrpSpPr>
+            <p:grpSpPr>
+              <a:xfrm>
+                <a:off x="3082636" y="1955531"/>
+                <a:ext cx="6393873" cy="3780251"/>
+                <a:chOff x="3082636" y="1955531"/>
+                <a:chExt cx="6393873" cy="3780251"/>
+              </a:xfrm>
+            </p:grpSpPr>
+            <p:sp>
+              <p:nvSpPr>
+                <p:cNvPr id="6" name="Rectangle 5">
+                  <a:extLst>
+                    <a:ext uri="{FF2B5EF4-FFF2-40B4-BE49-F238E27FC236}">
+                      <a16:creationId xmlns:a16="http://schemas.microsoft.com/office/drawing/2014/main" id="{B85B9F43-EEBD-5247-992B-99C9BFEE0579}"/>
+                    </a:ext>
+                  </a:extLst>
+                </p:cNvPr>
+                <p:cNvSpPr/>
+                <p:nvPr/>
+              </p:nvSpPr>
+              <p:spPr>
+                <a:xfrm>
+                  <a:off x="8769927" y="2357312"/>
+                  <a:ext cx="609600" cy="249382"/>
+                </a:xfrm>
+                <a:prstGeom prst="rect">
+                  <a:avLst/>
+                </a:prstGeom>
+                <a:solidFill>
+                  <a:srgbClr val="00B050">
+                    <a:alpha val="50196"/>
+                  </a:srgbClr>
+                </a:solidFill>
+                <a:ln>
+                  <a:noFill/>
+                </a:ln>
+              </p:spPr>
+              <p:style>
+                <a:lnRef idx="2">
+                  <a:schemeClr val="accent1">
+                    <a:shade val="50000"/>
+                  </a:schemeClr>
+                </a:lnRef>
+                <a:fillRef idx="1">
+                  <a:schemeClr val="accent1"/>
+                </a:fillRef>
+                <a:effectRef idx="0">
+                  <a:schemeClr val="accent1"/>
+                </a:effectRef>
+                <a:fontRef idx="minor">
+                  <a:schemeClr val="lt1"/>
+                </a:fontRef>
+              </p:style>
+              <p:txBody>
+                <a:bodyPr rtlCol="0" anchor="ctr"/>
+                <a:lstStyle/>
+                <a:p>
+                  <a:pPr algn="ctr"/>
+                  <a:endParaRPr lang="en-US" dirty="0"/>
+                </a:p>
+              </p:txBody>
+            </p:sp>
+            <p:sp>
+              <p:nvSpPr>
+                <p:cNvPr id="8" name="Rectangle 7">
+                  <a:extLst>
+                    <a:ext uri="{FF2B5EF4-FFF2-40B4-BE49-F238E27FC236}">
+                      <a16:creationId xmlns:a16="http://schemas.microsoft.com/office/drawing/2014/main" id="{BBD99BC6-4B66-C24F-B357-DAE27B419BD1}"/>
+                    </a:ext>
+                  </a:extLst>
+                </p:cNvPr>
+                <p:cNvSpPr/>
+                <p:nvPr/>
+              </p:nvSpPr>
+              <p:spPr>
+                <a:xfrm>
+                  <a:off x="8769927" y="3742766"/>
+                  <a:ext cx="609600" cy="249382"/>
+                </a:xfrm>
+                <a:prstGeom prst="rect">
+                  <a:avLst/>
+                </a:prstGeom>
+                <a:solidFill>
+                  <a:srgbClr val="00B050">
+                    <a:alpha val="50196"/>
+                  </a:srgbClr>
+                </a:solidFill>
+                <a:ln>
+                  <a:noFill/>
+                </a:ln>
+              </p:spPr>
+              <p:style>
+                <a:lnRef idx="2">
+                  <a:schemeClr val="accent1">
+                    <a:shade val="50000"/>
+                  </a:schemeClr>
+                </a:lnRef>
+                <a:fillRef idx="1">
+                  <a:schemeClr val="accent1"/>
+                </a:fillRef>
+                <a:effectRef idx="0">
+                  <a:schemeClr val="accent1"/>
+                </a:effectRef>
+                <a:fontRef idx="minor">
+                  <a:schemeClr val="lt1"/>
+                </a:fontRef>
+              </p:style>
+              <p:txBody>
+                <a:bodyPr rtlCol="0" anchor="ctr"/>
+                <a:lstStyle/>
+                <a:p>
+                  <a:pPr algn="ctr"/>
+                  <a:endParaRPr lang="en-US" dirty="0"/>
+                </a:p>
+              </p:txBody>
+            </p:sp>
+            <p:sp>
+              <p:nvSpPr>
+                <p:cNvPr id="9" name="Rectangle 8">
+                  <a:extLst>
+                    <a:ext uri="{FF2B5EF4-FFF2-40B4-BE49-F238E27FC236}">
+                      <a16:creationId xmlns:a16="http://schemas.microsoft.com/office/drawing/2014/main" id="{8279BBFD-B1E6-A24B-A7E9-86C5490E2CB8}"/>
+                    </a:ext>
+                  </a:extLst>
+                </p:cNvPr>
+                <p:cNvSpPr/>
+                <p:nvPr/>
+              </p:nvSpPr>
+              <p:spPr>
+                <a:xfrm>
+                  <a:off x="6116781" y="1955531"/>
+                  <a:ext cx="609600" cy="249382"/>
+                </a:xfrm>
+                <a:prstGeom prst="rect">
+                  <a:avLst/>
+                </a:prstGeom>
+                <a:solidFill>
+                  <a:srgbClr val="00B0F0">
+                    <a:alpha val="50196"/>
+                  </a:srgbClr>
+                </a:solidFill>
+                <a:ln>
+                  <a:noFill/>
+                </a:ln>
+              </p:spPr>
+              <p:style>
+                <a:lnRef idx="2">
+                  <a:schemeClr val="accent1">
+                    <a:shade val="50000"/>
+                  </a:schemeClr>
+                </a:lnRef>
+                <a:fillRef idx="1">
+                  <a:schemeClr val="accent1"/>
+                </a:fillRef>
+                <a:effectRef idx="0">
+                  <a:schemeClr val="accent1"/>
+                </a:effectRef>
+                <a:fontRef idx="minor">
+                  <a:schemeClr val="lt1"/>
+                </a:fontRef>
+              </p:style>
+              <p:txBody>
+                <a:bodyPr rtlCol="0" anchor="ctr"/>
+                <a:lstStyle/>
+                <a:p>
+                  <a:pPr algn="ctr"/>
+                  <a:endParaRPr lang="en-US" dirty="0"/>
+                </a:p>
+              </p:txBody>
+            </p:sp>
+            <p:sp>
+              <p:nvSpPr>
+                <p:cNvPr id="10" name="Rectangle 9">
+                  <a:extLst>
+                    <a:ext uri="{FF2B5EF4-FFF2-40B4-BE49-F238E27FC236}">
+                      <a16:creationId xmlns:a16="http://schemas.microsoft.com/office/drawing/2014/main" id="{55E6BF1F-570E-CE4B-80DD-58A1D2E632B2}"/>
+                    </a:ext>
+                  </a:extLst>
+                </p:cNvPr>
+                <p:cNvSpPr/>
+                <p:nvPr/>
+              </p:nvSpPr>
+              <p:spPr>
+                <a:xfrm>
+                  <a:off x="6130636" y="4075278"/>
+                  <a:ext cx="609600" cy="249382"/>
+                </a:xfrm>
+                <a:prstGeom prst="rect">
+                  <a:avLst/>
+                </a:prstGeom>
+                <a:solidFill>
+                  <a:srgbClr val="00B0F0">
+                    <a:alpha val="50196"/>
+                  </a:srgbClr>
+                </a:solidFill>
+                <a:ln>
+                  <a:noFill/>
+                </a:ln>
+              </p:spPr>
+              <p:style>
+                <a:lnRef idx="2">
+                  <a:schemeClr val="accent1">
+                    <a:shade val="50000"/>
+                  </a:schemeClr>
+                </a:lnRef>
+                <a:fillRef idx="1">
+                  <a:schemeClr val="accent1"/>
+                </a:fillRef>
+                <a:effectRef idx="0">
+                  <a:schemeClr val="accent1"/>
+                </a:effectRef>
+                <a:fontRef idx="minor">
+                  <a:schemeClr val="lt1"/>
+                </a:fontRef>
+              </p:style>
+              <p:txBody>
+                <a:bodyPr rtlCol="0" anchor="ctr"/>
+                <a:lstStyle/>
+                <a:p>
+                  <a:pPr algn="ctr"/>
+                  <a:endParaRPr lang="en-US" dirty="0"/>
+                </a:p>
+              </p:txBody>
+            </p:sp>
+            <p:sp>
+              <p:nvSpPr>
+                <p:cNvPr id="11" name="Rectangle 10">
+                  <a:extLst>
+                    <a:ext uri="{FF2B5EF4-FFF2-40B4-BE49-F238E27FC236}">
+                      <a16:creationId xmlns:a16="http://schemas.microsoft.com/office/drawing/2014/main" id="{A4F37037-2294-E544-B397-4DCB67963657}"/>
+                    </a:ext>
+                  </a:extLst>
+                </p:cNvPr>
+                <p:cNvSpPr/>
+                <p:nvPr/>
+              </p:nvSpPr>
+              <p:spPr>
+                <a:xfrm>
+                  <a:off x="4509654" y="3022331"/>
+                  <a:ext cx="609600" cy="249382"/>
+                </a:xfrm>
+                <a:prstGeom prst="rect">
+                  <a:avLst/>
+                </a:prstGeom>
+                <a:solidFill>
+                  <a:srgbClr val="FF0000">
+                    <a:alpha val="50196"/>
+                  </a:srgbClr>
+                </a:solidFill>
+                <a:ln>
+                  <a:noFill/>
+                </a:ln>
+              </p:spPr>
+              <p:style>
+                <a:lnRef idx="2">
+                  <a:schemeClr val="accent1">
+                    <a:shade val="50000"/>
+                  </a:schemeClr>
+                </a:lnRef>
+                <a:fillRef idx="1">
+                  <a:schemeClr val="accent1"/>
+                </a:fillRef>
+                <a:effectRef idx="0">
+                  <a:schemeClr val="accent1"/>
+                </a:effectRef>
+                <a:fontRef idx="minor">
+                  <a:schemeClr val="lt1"/>
+                </a:fontRef>
+              </p:style>
+              <p:txBody>
+                <a:bodyPr rtlCol="0" anchor="ctr"/>
+                <a:lstStyle/>
+                <a:p>
+                  <a:pPr algn="ctr"/>
+                  <a:endParaRPr lang="en-US" dirty="0"/>
+                </a:p>
+              </p:txBody>
+            </p:sp>
+            <p:sp>
+              <p:nvSpPr>
+                <p:cNvPr id="12" name="Rectangle 11">
+                  <a:extLst>
+                    <a:ext uri="{FF2B5EF4-FFF2-40B4-BE49-F238E27FC236}">
+                      <a16:creationId xmlns:a16="http://schemas.microsoft.com/office/drawing/2014/main" id="{4FE44822-E70F-5549-A046-33D11BEF0CD2}"/>
+                    </a:ext>
+                  </a:extLst>
+                </p:cNvPr>
+                <p:cNvSpPr/>
+                <p:nvPr/>
+              </p:nvSpPr>
+              <p:spPr>
+                <a:xfrm>
+                  <a:off x="3082636" y="3008476"/>
+                  <a:ext cx="609600" cy="249382"/>
+                </a:xfrm>
+                <a:prstGeom prst="rect">
+                  <a:avLst/>
+                </a:prstGeom>
+                <a:solidFill>
+                  <a:srgbClr val="FF0000">
+                    <a:alpha val="50196"/>
+                  </a:srgbClr>
+                </a:solidFill>
+                <a:ln>
+                  <a:noFill/>
+                </a:ln>
+              </p:spPr>
+              <p:style>
+                <a:lnRef idx="2">
+                  <a:schemeClr val="accent1">
+                    <a:shade val="50000"/>
+                  </a:schemeClr>
+                </a:lnRef>
+                <a:fillRef idx="1">
+                  <a:schemeClr val="accent1"/>
+                </a:fillRef>
+                <a:effectRef idx="0">
+                  <a:schemeClr val="accent1"/>
+                </a:effectRef>
+                <a:fontRef idx="minor">
+                  <a:schemeClr val="lt1"/>
+                </a:fontRef>
+              </p:style>
+              <p:txBody>
+                <a:bodyPr rtlCol="0" anchor="ctr"/>
+                <a:lstStyle/>
+                <a:p>
+                  <a:pPr algn="ctr"/>
+                  <a:endParaRPr lang="en-US" dirty="0"/>
+                </a:p>
+              </p:txBody>
+            </p:sp>
+            <p:sp>
+              <p:nvSpPr>
+                <p:cNvPr id="13" name="Rectangle 12">
+                  <a:extLst>
+                    <a:ext uri="{FF2B5EF4-FFF2-40B4-BE49-F238E27FC236}">
+                      <a16:creationId xmlns:a16="http://schemas.microsoft.com/office/drawing/2014/main" id="{22EAB1BD-C95D-0448-A653-86523A13672F}"/>
+                    </a:ext>
+                  </a:extLst>
+                </p:cNvPr>
+                <p:cNvSpPr/>
+                <p:nvPr/>
+              </p:nvSpPr>
+              <p:spPr>
+                <a:xfrm>
+                  <a:off x="6116781" y="5072805"/>
+                  <a:ext cx="609600" cy="249382"/>
+                </a:xfrm>
+                <a:prstGeom prst="rect">
+                  <a:avLst/>
+                </a:prstGeom>
+                <a:noFill/>
+                <a:ln w="38100">
+                  <a:solidFill>
+                    <a:srgbClr val="FFC000"/>
+                  </a:solidFill>
+                </a:ln>
+              </p:spPr>
+              <p:style>
+                <a:lnRef idx="2">
+                  <a:schemeClr val="accent1">
+                    <a:shade val="50000"/>
+                  </a:schemeClr>
+                </a:lnRef>
+                <a:fillRef idx="1">
+                  <a:schemeClr val="accent1"/>
+                </a:fillRef>
+                <a:effectRef idx="0">
+                  <a:schemeClr val="accent1"/>
+                </a:effectRef>
+                <a:fontRef idx="minor">
+                  <a:schemeClr val="lt1"/>
+                </a:fontRef>
+              </p:style>
+              <p:txBody>
+                <a:bodyPr rtlCol="0" anchor="ctr"/>
+                <a:lstStyle/>
+                <a:p>
+                  <a:pPr algn="ctr"/>
+                  <a:endParaRPr lang="en-US" dirty="0"/>
+                </a:p>
+              </p:txBody>
+            </p:sp>
+            <p:sp>
+              <p:nvSpPr>
+                <p:cNvPr id="14" name="Rectangle 13">
+                  <a:extLst>
+                    <a:ext uri="{FF2B5EF4-FFF2-40B4-BE49-F238E27FC236}">
+                      <a16:creationId xmlns:a16="http://schemas.microsoft.com/office/drawing/2014/main" id="{D8F79CC0-8946-1944-B294-E9F2C5C4DF7A}"/>
+                    </a:ext>
+                  </a:extLst>
+                </p:cNvPr>
+                <p:cNvSpPr/>
+                <p:nvPr/>
+              </p:nvSpPr>
+              <p:spPr>
+                <a:xfrm>
+                  <a:off x="6116781" y="3008476"/>
+                  <a:ext cx="609600" cy="249382"/>
+                </a:xfrm>
+                <a:prstGeom prst="rect">
+                  <a:avLst/>
+                </a:prstGeom>
+                <a:noFill/>
+                <a:ln w="38100">
+                  <a:solidFill>
+                    <a:srgbClr val="FFC000"/>
+                  </a:solidFill>
+                </a:ln>
+              </p:spPr>
+              <p:style>
+                <a:lnRef idx="2">
+                  <a:schemeClr val="accent1">
+                    <a:shade val="50000"/>
+                  </a:schemeClr>
+                </a:lnRef>
+                <a:fillRef idx="1">
+                  <a:schemeClr val="accent1"/>
+                </a:fillRef>
+                <a:effectRef idx="0">
+                  <a:schemeClr val="accent1"/>
+                </a:effectRef>
+                <a:fontRef idx="minor">
+                  <a:schemeClr val="lt1"/>
+                </a:fontRef>
+              </p:style>
+              <p:txBody>
+                <a:bodyPr rtlCol="0" anchor="ctr"/>
+                <a:lstStyle/>
+                <a:p>
+                  <a:pPr algn="ctr"/>
+                  <a:endParaRPr lang="en-US" dirty="0"/>
+                </a:p>
+              </p:txBody>
+            </p:sp>
+            <p:sp>
+              <p:nvSpPr>
+                <p:cNvPr id="15" name="Rectangle 14">
+                  <a:extLst>
+                    <a:ext uri="{FF2B5EF4-FFF2-40B4-BE49-F238E27FC236}">
+                      <a16:creationId xmlns:a16="http://schemas.microsoft.com/office/drawing/2014/main" id="{85DA3C45-A082-2641-AB25-BA481CFE16CD}"/>
+                    </a:ext>
+                  </a:extLst>
+                </p:cNvPr>
+                <p:cNvSpPr/>
+                <p:nvPr/>
+              </p:nvSpPr>
+              <p:spPr>
+                <a:xfrm>
+                  <a:off x="5680363" y="4724400"/>
+                  <a:ext cx="3796146" cy="1011382"/>
+                </a:xfrm>
+                <a:prstGeom prst="rect">
+                  <a:avLst/>
+                </a:prstGeom>
+                <a:solidFill>
+                  <a:schemeClr val="bg1">
+                    <a:lumMod val="85000"/>
+                    <a:alpha val="25098"/>
+                  </a:schemeClr>
+                </a:solidFill>
+                <a:ln>
+                  <a:noFill/>
+                </a:ln>
+              </p:spPr>
+              <p:style>
+                <a:lnRef idx="2">
+                  <a:schemeClr val="accent1">
+                    <a:shade val="50000"/>
+                  </a:schemeClr>
+                </a:lnRef>
+                <a:fillRef idx="1">
+                  <a:schemeClr val="accent1"/>
+                </a:fillRef>
+                <a:effectRef idx="0">
+                  <a:schemeClr val="accent1"/>
+                </a:effectRef>
+                <a:fontRef idx="minor">
+                  <a:schemeClr val="lt1"/>
+                </a:fontRef>
+              </p:style>
+              <p:txBody>
+                <a:bodyPr rtlCol="0" anchor="ctr"/>
+                <a:lstStyle/>
+                <a:p>
+                  <a:pPr algn="ctr"/>
+                  <a:endParaRPr lang="en-US" dirty="0"/>
+                </a:p>
+              </p:txBody>
+            </p:sp>
+            <p:sp>
+              <p:nvSpPr>
+                <p:cNvPr id="16" name="Rectangle 15">
+                  <a:extLst>
+                    <a:ext uri="{FF2B5EF4-FFF2-40B4-BE49-F238E27FC236}">
+                      <a16:creationId xmlns:a16="http://schemas.microsoft.com/office/drawing/2014/main" id="{C41FF8CB-D7E6-0041-9526-4C1DF30726D4}"/>
+                    </a:ext>
+                  </a:extLst>
+                </p:cNvPr>
+                <p:cNvSpPr/>
+                <p:nvPr/>
+              </p:nvSpPr>
+              <p:spPr>
+                <a:xfrm>
+                  <a:off x="7543798" y="2064327"/>
+                  <a:ext cx="1932711" cy="2660073"/>
+                </a:xfrm>
+                <a:prstGeom prst="rect">
+                  <a:avLst/>
+                </a:prstGeom>
+                <a:solidFill>
+                  <a:schemeClr val="bg1">
+                    <a:lumMod val="85000"/>
+                    <a:alpha val="25098"/>
+                  </a:schemeClr>
+                </a:solidFill>
+                <a:ln>
+                  <a:noFill/>
+                </a:ln>
+              </p:spPr>
+              <p:style>
+                <a:lnRef idx="2">
+                  <a:schemeClr val="accent1">
+                    <a:shade val="50000"/>
+                  </a:schemeClr>
+                </a:lnRef>
+                <a:fillRef idx="1">
+                  <a:schemeClr val="accent1"/>
+                </a:fillRef>
+                <a:effectRef idx="0">
+                  <a:schemeClr val="accent1"/>
+                </a:effectRef>
+                <a:fontRef idx="minor">
+                  <a:schemeClr val="lt1"/>
+                </a:fontRef>
+              </p:style>
+              <p:txBody>
+                <a:bodyPr rtlCol="0" anchor="ctr"/>
+                <a:lstStyle/>
+                <a:p>
+                  <a:pPr algn="ctr"/>
+                  <a:endParaRPr lang="en-US" dirty="0"/>
+                </a:p>
+              </p:txBody>
+            </p:sp>
+          </p:grpSp>
+          <p:sp>
+            <p:nvSpPr>
+              <p:cNvPr id="18" name="Rectangle 17">
+                <a:extLst>
+                  <a:ext uri="{FF2B5EF4-FFF2-40B4-BE49-F238E27FC236}">
+                    <a16:creationId xmlns:a16="http://schemas.microsoft.com/office/drawing/2014/main" id="{2239885F-9A7A-7444-A186-7B7602AE0A31}"/>
+                  </a:ext>
+                </a:extLst>
+              </p:cNvPr>
+              <p:cNvSpPr/>
+              <p:nvPr/>
+            </p:nvSpPr>
+            <p:spPr>
+              <a:xfrm>
+                <a:off x="1873644" y="241213"/>
+                <a:ext cx="609600" cy="249382"/>
+              </a:xfrm>
+              <a:prstGeom prst="rect">
+                <a:avLst/>
+              </a:prstGeom>
+              <a:noFill/>
+              <a:ln w="38100">
+                <a:solidFill>
+                  <a:srgbClr val="FFC000"/>
+                </a:solidFill>
+              </a:ln>
+            </p:spPr>
+            <p:style>
+              <a:lnRef idx="2">
+                <a:schemeClr val="accent1">
+                  <a:shade val="50000"/>
+                </a:schemeClr>
+              </a:lnRef>
+              <a:fillRef idx="1">
+                <a:schemeClr val="accent1"/>
+              </a:fillRef>
+              <a:effectRef idx="0">
+                <a:schemeClr val="accent1"/>
+              </a:effectRef>
+              <a:fontRef idx="minor">
+                <a:schemeClr val="lt1"/>
+              </a:fontRef>
+            </p:style>
+            <p:txBody>
+              <a:bodyPr rtlCol="0" anchor="ctr"/>
+              <a:lstStyle/>
+              <a:p>
+                <a:pPr algn="ctr"/>
+                <a:endParaRPr lang="en-US" dirty="0"/>
+              </a:p>
+            </p:txBody>
+          </p:sp>
+        </p:grpSp>
+        <p:sp>
+          <p:nvSpPr>
+            <p:cNvPr id="19" name="Rectangle 18">
+              <a:extLst>
+                <a:ext uri="{FF2B5EF4-FFF2-40B4-BE49-F238E27FC236}">
+                  <a16:creationId xmlns:a16="http://schemas.microsoft.com/office/drawing/2014/main" id="{73D255E5-2495-F54D-BC6C-2D03D703AD5A}"/>
+                </a:ext>
+              </a:extLst>
+            </p:cNvPr>
+            <p:cNvSpPr/>
+            <p:nvPr/>
+          </p:nvSpPr>
+          <p:spPr>
+            <a:xfrm>
+              <a:off x="1472592" y="5438274"/>
+              <a:ext cx="609600" cy="249382"/>
+            </a:xfrm>
+            <a:prstGeom prst="rect">
+              <a:avLst/>
+            </a:prstGeom>
+            <a:noFill/>
+            <a:ln w="38100">
+              <a:solidFill>
+                <a:srgbClr val="48B057"/>
+              </a:solidFill>
+            </a:ln>
+          </p:spPr>
+          <p:style>
+            <a:lnRef idx="2">
+              <a:schemeClr val="accent1">
+                <a:shade val="50000"/>
+              </a:schemeClr>
+            </a:lnRef>
+            <a:fillRef idx="1">
+              <a:schemeClr val="accent1"/>
+            </a:fillRef>
+            <a:effectRef idx="0">
+              <a:schemeClr val="accent1"/>
+            </a:effectRef>
+            <a:fontRef idx="minor">
+              <a:schemeClr val="lt1"/>
+            </a:fontRef>
+          </p:style>
+          <p:txBody>
+            <a:bodyPr rtlCol="0" anchor="ctr"/>
+            <a:lstStyle/>
+            <a:p>
+              <a:pPr algn="ctr"/>
+              <a:endParaRPr lang="en-US" dirty="0"/>
+            </a:p>
+          </p:txBody>
+        </p:sp>
+        <p:sp>
+          <p:nvSpPr>
+            <p:cNvPr id="21" name="Rectangle 20">
+              <a:extLst>
+                <a:ext uri="{FF2B5EF4-FFF2-40B4-BE49-F238E27FC236}">
+                  <a16:creationId xmlns:a16="http://schemas.microsoft.com/office/drawing/2014/main" id="{529A42D3-318C-7D4B-B2BB-8BA72C2FDC50}"/>
+                </a:ext>
+              </a:extLst>
+            </p:cNvPr>
+            <p:cNvSpPr/>
+            <p:nvPr/>
+          </p:nvSpPr>
+          <p:spPr>
+            <a:xfrm>
+              <a:off x="1854320" y="1738233"/>
+              <a:ext cx="609600" cy="249382"/>
+            </a:xfrm>
+            <a:prstGeom prst="rect">
+              <a:avLst/>
+            </a:prstGeom>
+            <a:noFill/>
+            <a:ln w="38100">
+              <a:solidFill>
+                <a:srgbClr val="48B057"/>
+              </a:solidFill>
+            </a:ln>
+          </p:spPr>
+          <p:style>
+            <a:lnRef idx="2">
+              <a:schemeClr val="accent1">
+                <a:shade val="50000"/>
+              </a:schemeClr>
+            </a:lnRef>
+            <a:fillRef idx="1">
+              <a:schemeClr val="accent1"/>
+            </a:fillRef>
+            <a:effectRef idx="0">
+              <a:schemeClr val="accent1"/>
+            </a:effectRef>
+            <a:fontRef idx="minor">
+              <a:schemeClr val="lt1"/>
+            </a:fontRef>
+          </p:style>
+          <p:txBody>
+            <a:bodyPr rtlCol="0" anchor="ctr"/>
+            <a:lstStyle/>
+            <a:p>
+              <a:pPr algn="ctr"/>
+              <a:endParaRPr lang="en-US" dirty="0"/>
+            </a:p>
+          </p:txBody>
+        </p:sp>
+        <p:sp>
+          <p:nvSpPr>
+            <p:cNvPr id="22" name="Rectangle 21">
+              <a:extLst>
+                <a:ext uri="{FF2B5EF4-FFF2-40B4-BE49-F238E27FC236}">
+                  <a16:creationId xmlns:a16="http://schemas.microsoft.com/office/drawing/2014/main" id="{C1DB1D68-C268-8143-9ABE-71330E882FA9}"/>
+                </a:ext>
+              </a:extLst>
+            </p:cNvPr>
+            <p:cNvSpPr/>
+            <p:nvPr/>
+          </p:nvSpPr>
+          <p:spPr>
+            <a:xfrm>
+              <a:off x="10359918" y="1923594"/>
+              <a:ext cx="609600" cy="249382"/>
+            </a:xfrm>
+            <a:prstGeom prst="rect">
+              <a:avLst/>
+            </a:prstGeom>
+            <a:noFill/>
+            <a:ln w="38100">
+              <a:solidFill>
+                <a:srgbClr val="48B057"/>
+              </a:solidFill>
+            </a:ln>
+          </p:spPr>
+          <p:style>
+            <a:lnRef idx="2">
+              <a:schemeClr val="accent1">
+                <a:shade val="50000"/>
+              </a:schemeClr>
+            </a:lnRef>
+            <a:fillRef idx="1">
+              <a:schemeClr val="accent1"/>
+            </a:fillRef>
+            <a:effectRef idx="0">
+              <a:schemeClr val="accent1"/>
+            </a:effectRef>
+            <a:fontRef idx="minor">
+              <a:schemeClr val="lt1"/>
+            </a:fontRef>
+          </p:style>
+          <p:txBody>
+            <a:bodyPr rtlCol="0" anchor="ctr"/>
+            <a:lstStyle/>
+            <a:p>
+              <a:pPr algn="ctr"/>
+              <a:endParaRPr lang="en-US" dirty="0"/>
+            </a:p>
+          </p:txBody>
+        </p:sp>
+      </p:grpSp>
+    </p:spTree>
+    <p:extLst>
+      <p:ext uri="{BB962C8B-B14F-4D97-AF65-F5344CB8AC3E}">
+        <p14:creationId xmlns:p14="http://schemas.microsoft.com/office/powerpoint/2010/main" val="2275225710"/>
+      </p:ext>
+    </p:extLst>
+  </p:cSld>
+  <p:clrMapOvr>
+    <a:masterClrMapping/>
+  </p:clrMapOvr>
+</p:sld>
+</file>
+
 <file path=ppt/slides/slide2.xml><?xml version="1.0" encoding="utf-8"?>
 <p:sld xmlns:a="http://schemas.openxmlformats.org/drawingml/2006/main" xmlns:r="http://schemas.openxmlformats.org/officeDocument/2006/relationships" xmlns:p="http://schemas.openxmlformats.org/presentationml/2006/main">
   <p:cSld>
@@ -6070,6 +7875,298 @@
     <p:extLst>
       <p:ext uri="{BB962C8B-B14F-4D97-AF65-F5344CB8AC3E}">
         <p14:creationId xmlns:p14="http://schemas.microsoft.com/office/powerpoint/2010/main" val="3200265892"/>
+      </p:ext>
+    </p:extLst>
+  </p:cSld>
+  <p:clrMapOvr>
+    <a:masterClrMapping/>
+  </p:clrMapOvr>
+</p:sld>
+</file>
+
+<file path=ppt/slides/slide8.xml><?xml version="1.0" encoding="utf-8"?>
+<p:sld xmlns:a="http://schemas.openxmlformats.org/drawingml/2006/main" xmlns:r="http://schemas.openxmlformats.org/officeDocument/2006/relationships" xmlns:p="http://schemas.openxmlformats.org/presentationml/2006/main">
+  <p:cSld>
+    <p:spTree>
+      <p:nvGrpSpPr>
+        <p:cNvPr id="1" name=""/>
+        <p:cNvGrpSpPr/>
+        <p:nvPr/>
+      </p:nvGrpSpPr>
+      <p:grpSpPr>
+        <a:xfrm>
+          <a:off x="0" y="0"/>
+          <a:ext cx="0" cy="0"/>
+          <a:chOff x="0" y="0"/>
+          <a:chExt cx="0" cy="0"/>
+        </a:xfrm>
+      </p:grpSpPr>
+      <p:pic>
+        <p:nvPicPr>
+          <p:cNvPr id="3" name="Picture 2">
+            <a:extLst>
+              <a:ext uri="{FF2B5EF4-FFF2-40B4-BE49-F238E27FC236}">
+                <a16:creationId xmlns:a16="http://schemas.microsoft.com/office/drawing/2014/main" id="{A7156BF2-8FD0-774C-96A5-A9AF4C80B9E6}"/>
+              </a:ext>
+            </a:extLst>
+          </p:cNvPr>
+          <p:cNvPicPr>
+            <a:picLocks noChangeAspect="1"/>
+          </p:cNvPicPr>
+          <p:nvPr/>
+        </p:nvPicPr>
+        <p:blipFill>
+          <a:blip r:embed="rId2">
+            <a:extLst>
+              <a:ext uri="{28A0092B-C50C-407E-A947-70E740481C1C}">
+                <a14:useLocalDpi xmlns:a14="http://schemas.microsoft.com/office/drawing/2010/main" val="0"/>
+              </a:ext>
+            </a:extLst>
+          </a:blip>
+          <a:stretch>
+            <a:fillRect/>
+          </a:stretch>
+        </p:blipFill>
+        <p:spPr>
+          <a:xfrm>
+            <a:off x="1574369" y="0"/>
+            <a:ext cx="9883589" cy="6858000"/>
+          </a:xfrm>
+          <a:prstGeom prst="rect">
+            <a:avLst/>
+          </a:prstGeom>
+        </p:spPr>
+      </p:pic>
+      <p:sp>
+        <p:nvSpPr>
+          <p:cNvPr id="5" name="Rectangle 4">
+            <a:extLst>
+              <a:ext uri="{FF2B5EF4-FFF2-40B4-BE49-F238E27FC236}">
+                <a16:creationId xmlns:a16="http://schemas.microsoft.com/office/drawing/2014/main" id="{5F7E3FE8-8563-F94E-BB09-F37FCD792459}"/>
+              </a:ext>
+            </a:extLst>
+          </p:cNvPr>
+          <p:cNvSpPr/>
+          <p:nvPr/>
+        </p:nvSpPr>
+        <p:spPr>
+          <a:xfrm>
+            <a:off x="898358" y="4700337"/>
+            <a:ext cx="2470484" cy="2157663"/>
+          </a:xfrm>
+          <a:prstGeom prst="rect">
+            <a:avLst/>
+          </a:prstGeom>
+          <a:solidFill>
+            <a:schemeClr val="bg1"/>
+          </a:solidFill>
+          <a:ln>
+            <a:solidFill>
+              <a:schemeClr val="bg1"/>
+            </a:solidFill>
+          </a:ln>
+        </p:spPr>
+        <p:style>
+          <a:lnRef idx="2">
+            <a:schemeClr val="accent1">
+              <a:shade val="50000"/>
+            </a:schemeClr>
+          </a:lnRef>
+          <a:fillRef idx="1">
+            <a:schemeClr val="accent1"/>
+          </a:fillRef>
+          <a:effectRef idx="0">
+            <a:schemeClr val="accent1"/>
+          </a:effectRef>
+          <a:fontRef idx="minor">
+            <a:schemeClr val="lt1"/>
+          </a:fontRef>
+        </p:style>
+        <p:txBody>
+          <a:bodyPr rtlCol="0" anchor="ctr"/>
+          <a:lstStyle/>
+          <a:p>
+            <a:pPr algn="ctr"/>
+            <a:endParaRPr lang="en-US" dirty="0"/>
+          </a:p>
+        </p:txBody>
+      </p:sp>
+    </p:spTree>
+    <p:extLst>
+      <p:ext uri="{BB962C8B-B14F-4D97-AF65-F5344CB8AC3E}">
+        <p14:creationId xmlns:p14="http://schemas.microsoft.com/office/powerpoint/2010/main" val="4239483754"/>
+      </p:ext>
+    </p:extLst>
+  </p:cSld>
+  <p:clrMapOvr>
+    <a:masterClrMapping/>
+  </p:clrMapOvr>
+</p:sld>
+</file>
+
+<file path=ppt/slides/slide9.xml><?xml version="1.0" encoding="utf-8"?>
+<p:sld xmlns:a="http://schemas.openxmlformats.org/drawingml/2006/main" xmlns:r="http://schemas.openxmlformats.org/officeDocument/2006/relationships" xmlns:p="http://schemas.openxmlformats.org/presentationml/2006/main">
+  <p:cSld>
+    <p:spTree>
+      <p:nvGrpSpPr>
+        <p:cNvPr id="1" name=""/>
+        <p:cNvGrpSpPr/>
+        <p:nvPr/>
+      </p:nvGrpSpPr>
+      <p:grpSpPr>
+        <a:xfrm>
+          <a:off x="0" y="0"/>
+          <a:ext cx="0" cy="0"/>
+          <a:chOff x="0" y="0"/>
+          <a:chExt cx="0" cy="0"/>
+        </a:xfrm>
+      </p:grpSpPr>
+      <p:pic>
+        <p:nvPicPr>
+          <p:cNvPr id="3" name="Picture 2">
+            <a:extLst>
+              <a:ext uri="{FF2B5EF4-FFF2-40B4-BE49-F238E27FC236}">
+                <a16:creationId xmlns:a16="http://schemas.microsoft.com/office/drawing/2014/main" id="{A7156BF2-8FD0-774C-96A5-A9AF4C80B9E6}"/>
+              </a:ext>
+            </a:extLst>
+          </p:cNvPr>
+          <p:cNvPicPr>
+            <a:picLocks noChangeAspect="1"/>
+          </p:cNvPicPr>
+          <p:nvPr/>
+        </p:nvPicPr>
+        <p:blipFill>
+          <a:blip r:embed="rId3">
+            <a:extLst>
+              <a:ext uri="{28A0092B-C50C-407E-A947-70E740481C1C}">
+                <a14:useLocalDpi xmlns:a14="http://schemas.microsoft.com/office/drawing/2010/main" val="0"/>
+              </a:ext>
+            </a:extLst>
+          </a:blip>
+          <a:stretch>
+            <a:fillRect/>
+          </a:stretch>
+        </p:blipFill>
+        <p:spPr>
+          <a:xfrm>
+            <a:off x="1574369" y="0"/>
+            <a:ext cx="9883589" cy="6858000"/>
+          </a:xfrm>
+          <a:prstGeom prst="rect">
+            <a:avLst/>
+          </a:prstGeom>
+        </p:spPr>
+      </p:pic>
+      <p:sp>
+        <p:nvSpPr>
+          <p:cNvPr id="5" name="Rectangle 4">
+            <a:extLst>
+              <a:ext uri="{FF2B5EF4-FFF2-40B4-BE49-F238E27FC236}">
+                <a16:creationId xmlns:a16="http://schemas.microsoft.com/office/drawing/2014/main" id="{5F7E3FE8-8563-F94E-BB09-F37FCD792459}"/>
+              </a:ext>
+            </a:extLst>
+          </p:cNvPr>
+          <p:cNvSpPr/>
+          <p:nvPr/>
+        </p:nvSpPr>
+        <p:spPr>
+          <a:xfrm>
+            <a:off x="898358" y="4700337"/>
+            <a:ext cx="2470484" cy="2157663"/>
+          </a:xfrm>
+          <a:prstGeom prst="rect">
+            <a:avLst/>
+          </a:prstGeom>
+          <a:solidFill>
+            <a:schemeClr val="bg1"/>
+          </a:solidFill>
+          <a:ln>
+            <a:solidFill>
+              <a:schemeClr val="bg1"/>
+            </a:solidFill>
+          </a:ln>
+        </p:spPr>
+        <p:style>
+          <a:lnRef idx="2">
+            <a:schemeClr val="accent1">
+              <a:shade val="50000"/>
+            </a:schemeClr>
+          </a:lnRef>
+          <a:fillRef idx="1">
+            <a:schemeClr val="accent1"/>
+          </a:fillRef>
+          <a:effectRef idx="0">
+            <a:schemeClr val="accent1"/>
+          </a:effectRef>
+          <a:fontRef idx="minor">
+            <a:schemeClr val="lt1"/>
+          </a:fontRef>
+        </p:style>
+        <p:txBody>
+          <a:bodyPr rtlCol="0" anchor="ctr"/>
+          <a:lstStyle/>
+          <a:p>
+            <a:pPr algn="ctr"/>
+            <a:endParaRPr lang="en-US" dirty="0"/>
+          </a:p>
+        </p:txBody>
+      </p:sp>
+      <p:sp>
+        <p:nvSpPr>
+          <p:cNvPr id="6" name="Oval 5">
+            <a:extLst>
+              <a:ext uri="{FF2B5EF4-FFF2-40B4-BE49-F238E27FC236}">
+                <a16:creationId xmlns:a16="http://schemas.microsoft.com/office/drawing/2014/main" id="{B2EB1FF5-20DC-7547-9130-82C217AD6F9A}"/>
+              </a:ext>
+            </a:extLst>
+          </p:cNvPr>
+          <p:cNvSpPr/>
+          <p:nvPr/>
+        </p:nvSpPr>
+        <p:spPr>
+          <a:xfrm>
+            <a:off x="7707086" y="1227909"/>
+            <a:ext cx="3750872" cy="2769325"/>
+          </a:xfrm>
+          <a:prstGeom prst="ellipse">
+            <a:avLst/>
+          </a:prstGeom>
+          <a:noFill/>
+          <a:ln>
+            <a:solidFill>
+              <a:schemeClr val="tx1"/>
+            </a:solidFill>
+          </a:ln>
+        </p:spPr>
+        <p:style>
+          <a:lnRef idx="2">
+            <a:schemeClr val="accent1">
+              <a:shade val="50000"/>
+            </a:schemeClr>
+          </a:lnRef>
+          <a:fillRef idx="1">
+            <a:schemeClr val="accent1"/>
+          </a:fillRef>
+          <a:effectRef idx="0">
+            <a:schemeClr val="accent1"/>
+          </a:effectRef>
+          <a:fontRef idx="minor">
+            <a:schemeClr val="lt1"/>
+          </a:fontRef>
+        </p:style>
+        <p:txBody>
+          <a:bodyPr rtlCol="0" anchor="ctr"/>
+          <a:lstStyle/>
+          <a:p>
+            <a:pPr algn="ctr"/>
+            <a:endParaRPr lang="en-US" dirty="0"/>
+          </a:p>
+        </p:txBody>
+      </p:sp>
+    </p:spTree>
+    <p:extLst>
+      <p:ext uri="{BB962C8B-B14F-4D97-AF65-F5344CB8AC3E}">
+        <p14:creationId xmlns:p14="http://schemas.microsoft.com/office/powerpoint/2010/main" val="128748748"/>
       </p:ext>
     </p:extLst>
   </p:cSld>

</xml_diff>